<commit_message>
Added results to pdf
</commit_message>
<xml_diff>
--- a/Presentacion TP1/SIA-TP1.pptx
+++ b/Presentacion TP1/SIA-TP1.pptx
@@ -8016,10 +8016,46 @@
         </p:nvSpPr>
         <p:spPr/>
         <p:txBody>
-          <a:bodyPr/>
+          <a:bodyPr>
+            <a:normAutofit fontScale="92500"/>
+          </a:bodyPr>
           <a:lstStyle/>
           <a:p>
-            <a:endParaRPr lang="es-ES_tradnl"/>
+            <a:r>
+              <a:rPr lang="es-ES_tradnl" dirty="0" smtClean="0"/>
+              <a:t>Los algoritmos no informados no lograron encontrar soluci</a:t>
+            </a:r>
+            <a:r>
+              <a:rPr lang="es-ES_tradnl" dirty="0" smtClean="0"/>
+              <a:t>ón para tableros de dimensión mayor a 2x2. Para tableros de dimensión mayor la memoria RAM fue una limitación</a:t>
+            </a:r>
+          </a:p>
+          <a:p>
+            <a:r>
+              <a:rPr lang="es-ES_tradnl" dirty="0" err="1" smtClean="0"/>
+              <a:t>Greedy</a:t>
+            </a:r>
+            <a:r>
+              <a:rPr lang="es-ES_tradnl" dirty="0" smtClean="0"/>
+              <a:t> llegó a resolver tableros de hasta 4x4.</a:t>
+            </a:r>
+          </a:p>
+          <a:p>
+            <a:r>
+              <a:rPr lang="es-ES_tradnl" dirty="0" err="1" smtClean="0"/>
+              <a:t>AStar</a:t>
+            </a:r>
+            <a:r>
+              <a:rPr lang="es-ES_tradnl" dirty="0" smtClean="0"/>
+              <a:t> logró resolver tableros de hasta 6x6.</a:t>
+            </a:r>
+          </a:p>
+          <a:p>
+            <a:r>
+              <a:rPr lang="es-ES_tradnl" dirty="0" smtClean="0"/>
+              <a:t>Para tableros de dimensión superior, la memoria RAM fue una limitación.</a:t>
+            </a:r>
+            <a:endParaRPr lang="es-ES_tradnl" dirty="0"/>
           </a:p>
         </p:txBody>
       </p:sp>

</xml_diff>